<commit_message>
Presentation update for Tools workshop
</commit_message>
<xml_diff>
--- a/Examples/Presentations/Debugging and profiling tools.pptx
+++ b/Examples/Presentations/Debugging and profiling tools.pptx
@@ -12,6 +12,8 @@
     <p:sldId id="260" r:id="rId6"/>
     <p:sldId id="261" r:id="rId7"/>
     <p:sldId id="262" r:id="rId8"/>
+    <p:sldId id="263" r:id="rId9"/>
+    <p:sldId id="264" r:id="rId10"/>
   </p:sldIdLst>
   <p:sldSz cx="12192000" cy="6858000"/>
   <p:notesSz cx="6858000" cy="9144000"/>
@@ -110,7 +112,16 @@
       </a:defRPr>
     </a:lvl9pPr>
   </p:defaultTextStyle>
+  <p:extLst>
+    <p:ext uri="{EFAFB233-063F-42B5-8137-9DF3F51BA10A}">
+      <p15:sldGuideLst xmlns:p15="http://schemas.microsoft.com/office/powerpoint/2012/main"/>
+    </p:ext>
+  </p:extLst>
 </p:presentation>
+</file>
+
+<file path=ppt/revisionInfo.xml><?xml version="1.0" encoding="utf-8"?>
+<p1510:revInfo xmlns:a="http://schemas.openxmlformats.org/drawingml/2006/main" xmlns:r="http://schemas.openxmlformats.org/officeDocument/2006/relationships" xmlns:p1510="http://schemas.microsoft.com/office/powerpoint/2015/10/main"/>
 </file>
 
 <file path=ppt/slideLayouts/slideLayout1.xml><?xml version="1.0" encoding="utf-8"?>
@@ -155,10 +166,9 @@
           </a:lstStyle>
           <a:p>
             <a:r>
-              <a:rPr lang="en-US" smtClean="0"/>
+              <a:rPr lang="en-US"/>
               <a:t>Click to edit Master title style</a:t>
             </a:r>
-            <a:endParaRPr lang="en-US"/>
           </a:p>
         </p:txBody>
       </p:sp>
@@ -220,10 +230,9 @@
           </a:lstStyle>
           <a:p>
             <a:r>
-              <a:rPr lang="en-US" smtClean="0"/>
+              <a:rPr lang="en-US"/>
               <a:t>Click to edit Master subtitle style</a:t>
             </a:r>
-            <a:endParaRPr lang="en-US"/>
           </a:p>
         </p:txBody>
       </p:sp>
@@ -244,7 +253,7 @@
           <a:p>
             <a:fld id="{FC2436FE-5B44-4FB0-AF7D-0B9EB63CA7D8}" type="datetimeFigureOut">
               <a:rPr lang="en-US" smtClean="0"/>
-              <a:t>10/4/2016</a:t>
+              <a:t>9/19/2017</a:t>
             </a:fld>
             <a:endParaRPr lang="en-US"/>
           </a:p>
@@ -338,10 +347,9 @@
           <a:lstStyle/>
           <a:p>
             <a:r>
-              <a:rPr lang="en-US" smtClean="0"/>
+              <a:rPr lang="en-US"/>
               <a:t>Click to edit Master title style</a:t>
             </a:r>
-            <a:endParaRPr lang="en-US"/>
           </a:p>
         </p:txBody>
       </p:sp>
@@ -362,38 +370,37 @@
           <a:p>
             <a:pPr lvl="0"/>
             <a:r>
-              <a:rPr lang="en-US" smtClean="0"/>
+              <a:rPr lang="en-US"/>
               <a:t>Click to edit Master text styles</a:t>
             </a:r>
           </a:p>
           <a:p>
             <a:pPr lvl="1"/>
             <a:r>
-              <a:rPr lang="en-US" smtClean="0"/>
+              <a:rPr lang="en-US"/>
               <a:t>Second level</a:t>
             </a:r>
           </a:p>
           <a:p>
             <a:pPr lvl="2"/>
             <a:r>
-              <a:rPr lang="en-US" smtClean="0"/>
+              <a:rPr lang="en-US"/>
               <a:t>Third level</a:t>
             </a:r>
           </a:p>
           <a:p>
             <a:pPr lvl="3"/>
             <a:r>
-              <a:rPr lang="en-US" smtClean="0"/>
+              <a:rPr lang="en-US"/>
               <a:t>Fourth level</a:t>
             </a:r>
           </a:p>
           <a:p>
             <a:pPr lvl="4"/>
             <a:r>
-              <a:rPr lang="en-US" smtClean="0"/>
+              <a:rPr lang="en-US"/>
               <a:t>Fifth level</a:t>
             </a:r>
-            <a:endParaRPr lang="en-US"/>
           </a:p>
         </p:txBody>
       </p:sp>
@@ -414,7 +421,7 @@
           <a:p>
             <a:fld id="{FC2436FE-5B44-4FB0-AF7D-0B9EB63CA7D8}" type="datetimeFigureOut">
               <a:rPr lang="en-US" smtClean="0"/>
-              <a:t>10/4/2016</a:t>
+              <a:t>9/19/2017</a:t>
             </a:fld>
             <a:endParaRPr lang="en-US"/>
           </a:p>
@@ -513,10 +520,9 @@
           <a:lstStyle/>
           <a:p>
             <a:r>
-              <a:rPr lang="en-US" smtClean="0"/>
+              <a:rPr lang="en-US"/>
               <a:t>Click to edit Master title style</a:t>
             </a:r>
-            <a:endParaRPr lang="en-US"/>
           </a:p>
         </p:txBody>
       </p:sp>
@@ -542,38 +548,37 @@
           <a:p>
             <a:pPr lvl="0"/>
             <a:r>
-              <a:rPr lang="en-US" smtClean="0"/>
+              <a:rPr lang="en-US"/>
               <a:t>Click to edit Master text styles</a:t>
             </a:r>
           </a:p>
           <a:p>
             <a:pPr lvl="1"/>
             <a:r>
-              <a:rPr lang="en-US" smtClean="0"/>
+              <a:rPr lang="en-US"/>
               <a:t>Second level</a:t>
             </a:r>
           </a:p>
           <a:p>
             <a:pPr lvl="2"/>
             <a:r>
-              <a:rPr lang="en-US" smtClean="0"/>
+              <a:rPr lang="en-US"/>
               <a:t>Third level</a:t>
             </a:r>
           </a:p>
           <a:p>
             <a:pPr lvl="3"/>
             <a:r>
-              <a:rPr lang="en-US" smtClean="0"/>
+              <a:rPr lang="en-US"/>
               <a:t>Fourth level</a:t>
             </a:r>
           </a:p>
           <a:p>
             <a:pPr lvl="4"/>
             <a:r>
-              <a:rPr lang="en-US" smtClean="0"/>
+              <a:rPr lang="en-US"/>
               <a:t>Fifth level</a:t>
             </a:r>
-            <a:endParaRPr lang="en-US"/>
           </a:p>
         </p:txBody>
       </p:sp>
@@ -594,7 +599,7 @@
           <a:p>
             <a:fld id="{FC2436FE-5B44-4FB0-AF7D-0B9EB63CA7D8}" type="datetimeFigureOut">
               <a:rPr lang="en-US" smtClean="0"/>
-              <a:t>10/4/2016</a:t>
+              <a:t>9/19/2017</a:t>
             </a:fld>
             <a:endParaRPr lang="en-US"/>
           </a:p>
@@ -688,10 +693,9 @@
           <a:lstStyle/>
           <a:p>
             <a:r>
-              <a:rPr lang="en-US" smtClean="0"/>
+              <a:rPr lang="en-US"/>
               <a:t>Click to edit Master title style</a:t>
             </a:r>
-            <a:endParaRPr lang="en-US"/>
           </a:p>
         </p:txBody>
       </p:sp>
@@ -712,38 +716,37 @@
           <a:p>
             <a:pPr lvl="0"/>
             <a:r>
-              <a:rPr lang="en-US" smtClean="0"/>
+              <a:rPr lang="en-US"/>
               <a:t>Click to edit Master text styles</a:t>
             </a:r>
           </a:p>
           <a:p>
             <a:pPr lvl="1"/>
             <a:r>
-              <a:rPr lang="en-US" smtClean="0"/>
+              <a:rPr lang="en-US"/>
               <a:t>Second level</a:t>
             </a:r>
           </a:p>
           <a:p>
             <a:pPr lvl="2"/>
             <a:r>
-              <a:rPr lang="en-US" smtClean="0"/>
+              <a:rPr lang="en-US"/>
               <a:t>Third level</a:t>
             </a:r>
           </a:p>
           <a:p>
             <a:pPr lvl="3"/>
             <a:r>
-              <a:rPr lang="en-US" smtClean="0"/>
+              <a:rPr lang="en-US"/>
               <a:t>Fourth level</a:t>
             </a:r>
           </a:p>
           <a:p>
             <a:pPr lvl="4"/>
             <a:r>
-              <a:rPr lang="en-US" smtClean="0"/>
+              <a:rPr lang="en-US"/>
               <a:t>Fifth level</a:t>
             </a:r>
-            <a:endParaRPr lang="en-US"/>
           </a:p>
         </p:txBody>
       </p:sp>
@@ -764,7 +767,7 @@
           <a:p>
             <a:fld id="{FC2436FE-5B44-4FB0-AF7D-0B9EB63CA7D8}" type="datetimeFigureOut">
               <a:rPr lang="en-US" smtClean="0"/>
-              <a:t>10/4/2016</a:t>
+              <a:t>9/19/2017</a:t>
             </a:fld>
             <a:endParaRPr lang="en-US"/>
           </a:p>
@@ -867,10 +870,9 @@
           </a:lstStyle>
           <a:p>
             <a:r>
-              <a:rPr lang="en-US" smtClean="0"/>
+              <a:rPr lang="en-US"/>
               <a:t>Click to edit Master title style</a:t>
             </a:r>
-            <a:endParaRPr lang="en-US"/>
           </a:p>
         </p:txBody>
       </p:sp>
@@ -987,7 +989,7 @@
           <a:p>
             <a:pPr lvl="0"/>
             <a:r>
-              <a:rPr lang="en-US" smtClean="0"/>
+              <a:rPr lang="en-US"/>
               <a:t>Click to edit Master text styles</a:t>
             </a:r>
           </a:p>
@@ -1010,7 +1012,7 @@
           <a:p>
             <a:fld id="{FC2436FE-5B44-4FB0-AF7D-0B9EB63CA7D8}" type="datetimeFigureOut">
               <a:rPr lang="en-US" smtClean="0"/>
-              <a:t>10/4/2016</a:t>
+              <a:t>9/19/2017</a:t>
             </a:fld>
             <a:endParaRPr lang="en-US"/>
           </a:p>
@@ -1104,10 +1106,9 @@
           <a:lstStyle/>
           <a:p>
             <a:r>
-              <a:rPr lang="en-US" smtClean="0"/>
+              <a:rPr lang="en-US"/>
               <a:t>Click to edit Master title style</a:t>
             </a:r>
-            <a:endParaRPr lang="en-US"/>
           </a:p>
         </p:txBody>
       </p:sp>
@@ -1133,38 +1134,37 @@
           <a:p>
             <a:pPr lvl="0"/>
             <a:r>
-              <a:rPr lang="en-US" smtClean="0"/>
+              <a:rPr lang="en-US"/>
               <a:t>Click to edit Master text styles</a:t>
             </a:r>
           </a:p>
           <a:p>
             <a:pPr lvl="1"/>
             <a:r>
-              <a:rPr lang="en-US" smtClean="0"/>
+              <a:rPr lang="en-US"/>
               <a:t>Second level</a:t>
             </a:r>
           </a:p>
           <a:p>
             <a:pPr lvl="2"/>
             <a:r>
-              <a:rPr lang="en-US" smtClean="0"/>
+              <a:rPr lang="en-US"/>
               <a:t>Third level</a:t>
             </a:r>
           </a:p>
           <a:p>
             <a:pPr lvl="3"/>
             <a:r>
-              <a:rPr lang="en-US" smtClean="0"/>
+              <a:rPr lang="en-US"/>
               <a:t>Fourth level</a:t>
             </a:r>
           </a:p>
           <a:p>
             <a:pPr lvl="4"/>
             <a:r>
-              <a:rPr lang="en-US" smtClean="0"/>
+              <a:rPr lang="en-US"/>
               <a:t>Fifth level</a:t>
             </a:r>
-            <a:endParaRPr lang="en-US"/>
           </a:p>
         </p:txBody>
       </p:sp>
@@ -1190,38 +1190,37 @@
           <a:p>
             <a:pPr lvl="0"/>
             <a:r>
-              <a:rPr lang="en-US" smtClean="0"/>
+              <a:rPr lang="en-US"/>
               <a:t>Click to edit Master text styles</a:t>
             </a:r>
           </a:p>
           <a:p>
             <a:pPr lvl="1"/>
             <a:r>
-              <a:rPr lang="en-US" smtClean="0"/>
+              <a:rPr lang="en-US"/>
               <a:t>Second level</a:t>
             </a:r>
           </a:p>
           <a:p>
             <a:pPr lvl="2"/>
             <a:r>
-              <a:rPr lang="en-US" smtClean="0"/>
+              <a:rPr lang="en-US"/>
               <a:t>Third level</a:t>
             </a:r>
           </a:p>
           <a:p>
             <a:pPr lvl="3"/>
             <a:r>
-              <a:rPr lang="en-US" smtClean="0"/>
+              <a:rPr lang="en-US"/>
               <a:t>Fourth level</a:t>
             </a:r>
           </a:p>
           <a:p>
             <a:pPr lvl="4"/>
             <a:r>
-              <a:rPr lang="en-US" smtClean="0"/>
+              <a:rPr lang="en-US"/>
               <a:t>Fifth level</a:t>
             </a:r>
-            <a:endParaRPr lang="en-US"/>
           </a:p>
         </p:txBody>
       </p:sp>
@@ -1242,7 +1241,7 @@
           <a:p>
             <a:fld id="{FC2436FE-5B44-4FB0-AF7D-0B9EB63CA7D8}" type="datetimeFigureOut">
               <a:rPr lang="en-US" smtClean="0"/>
-              <a:t>10/4/2016</a:t>
+              <a:t>9/19/2017</a:t>
             </a:fld>
             <a:endParaRPr lang="en-US"/>
           </a:p>
@@ -1341,10 +1340,9 @@
           <a:lstStyle/>
           <a:p>
             <a:r>
-              <a:rPr lang="en-US" smtClean="0"/>
+              <a:rPr lang="en-US"/>
               <a:t>Click to edit Master title style</a:t>
             </a:r>
-            <a:endParaRPr lang="en-US"/>
           </a:p>
         </p:txBody>
       </p:sp>
@@ -1407,7 +1405,7 @@
           <a:p>
             <a:pPr lvl="0"/>
             <a:r>
-              <a:rPr lang="en-US" smtClean="0"/>
+              <a:rPr lang="en-US"/>
               <a:t>Click to edit Master text styles</a:t>
             </a:r>
           </a:p>
@@ -1435,38 +1433,37 @@
           <a:p>
             <a:pPr lvl="0"/>
             <a:r>
-              <a:rPr lang="en-US" smtClean="0"/>
+              <a:rPr lang="en-US"/>
               <a:t>Click to edit Master text styles</a:t>
             </a:r>
           </a:p>
           <a:p>
             <a:pPr lvl="1"/>
             <a:r>
-              <a:rPr lang="en-US" smtClean="0"/>
+              <a:rPr lang="en-US"/>
               <a:t>Second level</a:t>
             </a:r>
           </a:p>
           <a:p>
             <a:pPr lvl="2"/>
             <a:r>
-              <a:rPr lang="en-US" smtClean="0"/>
+              <a:rPr lang="en-US"/>
               <a:t>Third level</a:t>
             </a:r>
           </a:p>
           <a:p>
             <a:pPr lvl="3"/>
             <a:r>
-              <a:rPr lang="en-US" smtClean="0"/>
+              <a:rPr lang="en-US"/>
               <a:t>Fourth level</a:t>
             </a:r>
           </a:p>
           <a:p>
             <a:pPr lvl="4"/>
             <a:r>
-              <a:rPr lang="en-US" smtClean="0"/>
+              <a:rPr lang="en-US"/>
               <a:t>Fifth level</a:t>
             </a:r>
-            <a:endParaRPr lang="en-US"/>
           </a:p>
         </p:txBody>
       </p:sp>
@@ -1529,7 +1526,7 @@
           <a:p>
             <a:pPr lvl="0"/>
             <a:r>
-              <a:rPr lang="en-US" smtClean="0"/>
+              <a:rPr lang="en-US"/>
               <a:t>Click to edit Master text styles</a:t>
             </a:r>
           </a:p>
@@ -1557,38 +1554,37 @@
           <a:p>
             <a:pPr lvl="0"/>
             <a:r>
-              <a:rPr lang="en-US" smtClean="0"/>
+              <a:rPr lang="en-US"/>
               <a:t>Click to edit Master text styles</a:t>
             </a:r>
           </a:p>
           <a:p>
             <a:pPr lvl="1"/>
             <a:r>
-              <a:rPr lang="en-US" smtClean="0"/>
+              <a:rPr lang="en-US"/>
               <a:t>Second level</a:t>
             </a:r>
           </a:p>
           <a:p>
             <a:pPr lvl="2"/>
             <a:r>
-              <a:rPr lang="en-US" smtClean="0"/>
+              <a:rPr lang="en-US"/>
               <a:t>Third level</a:t>
             </a:r>
           </a:p>
           <a:p>
             <a:pPr lvl="3"/>
             <a:r>
-              <a:rPr lang="en-US" smtClean="0"/>
+              <a:rPr lang="en-US"/>
               <a:t>Fourth level</a:t>
             </a:r>
           </a:p>
           <a:p>
             <a:pPr lvl="4"/>
             <a:r>
-              <a:rPr lang="en-US" smtClean="0"/>
+              <a:rPr lang="en-US"/>
               <a:t>Fifth level</a:t>
             </a:r>
-            <a:endParaRPr lang="en-US"/>
           </a:p>
         </p:txBody>
       </p:sp>
@@ -1609,7 +1605,7 @@
           <a:p>
             <a:fld id="{FC2436FE-5B44-4FB0-AF7D-0B9EB63CA7D8}" type="datetimeFigureOut">
               <a:rPr lang="en-US" smtClean="0"/>
-              <a:t>10/4/2016</a:t>
+              <a:t>9/19/2017</a:t>
             </a:fld>
             <a:endParaRPr lang="en-US"/>
           </a:p>
@@ -1703,10 +1699,9 @@
           <a:lstStyle/>
           <a:p>
             <a:r>
-              <a:rPr lang="en-US" smtClean="0"/>
+              <a:rPr lang="en-US"/>
               <a:t>Click to edit Master title style</a:t>
             </a:r>
-            <a:endParaRPr lang="en-US"/>
           </a:p>
         </p:txBody>
       </p:sp>
@@ -1727,7 +1722,7 @@
           <a:p>
             <a:fld id="{FC2436FE-5B44-4FB0-AF7D-0B9EB63CA7D8}" type="datetimeFigureOut">
               <a:rPr lang="en-US" smtClean="0"/>
-              <a:t>10/4/2016</a:t>
+              <a:t>9/19/2017</a:t>
             </a:fld>
             <a:endParaRPr lang="en-US"/>
           </a:p>
@@ -1822,7 +1817,7 @@
           <a:p>
             <a:fld id="{FC2436FE-5B44-4FB0-AF7D-0B9EB63CA7D8}" type="datetimeFigureOut">
               <a:rPr lang="en-US" smtClean="0"/>
-              <a:t>10/4/2016</a:t>
+              <a:t>9/19/2017</a:t>
             </a:fld>
             <a:endParaRPr lang="en-US"/>
           </a:p>
@@ -1925,10 +1920,9 @@
           </a:lstStyle>
           <a:p>
             <a:r>
-              <a:rPr lang="en-US" smtClean="0"/>
+              <a:rPr lang="en-US"/>
               <a:t>Click to edit Master title style</a:t>
             </a:r>
-            <a:endParaRPr lang="en-US"/>
           </a:p>
         </p:txBody>
       </p:sp>
@@ -1982,38 +1976,37 @@
           <a:p>
             <a:pPr lvl="0"/>
             <a:r>
-              <a:rPr lang="en-US" smtClean="0"/>
+              <a:rPr lang="en-US"/>
               <a:t>Click to edit Master text styles</a:t>
             </a:r>
           </a:p>
           <a:p>
             <a:pPr lvl="1"/>
             <a:r>
-              <a:rPr lang="en-US" smtClean="0"/>
+              <a:rPr lang="en-US"/>
               <a:t>Second level</a:t>
             </a:r>
           </a:p>
           <a:p>
             <a:pPr lvl="2"/>
             <a:r>
-              <a:rPr lang="en-US" smtClean="0"/>
+              <a:rPr lang="en-US"/>
               <a:t>Third level</a:t>
             </a:r>
           </a:p>
           <a:p>
             <a:pPr lvl="3"/>
             <a:r>
-              <a:rPr lang="en-US" smtClean="0"/>
+              <a:rPr lang="en-US"/>
               <a:t>Fourth level</a:t>
             </a:r>
           </a:p>
           <a:p>
             <a:pPr lvl="4"/>
             <a:r>
-              <a:rPr lang="en-US" smtClean="0"/>
+              <a:rPr lang="en-US"/>
               <a:t>Fifth level</a:t>
             </a:r>
-            <a:endParaRPr lang="en-US"/>
           </a:p>
         </p:txBody>
       </p:sp>
@@ -2076,7 +2069,7 @@
           <a:p>
             <a:pPr lvl="0"/>
             <a:r>
-              <a:rPr lang="en-US" smtClean="0"/>
+              <a:rPr lang="en-US"/>
               <a:t>Click to edit Master text styles</a:t>
             </a:r>
           </a:p>
@@ -2099,7 +2092,7 @@
           <a:p>
             <a:fld id="{FC2436FE-5B44-4FB0-AF7D-0B9EB63CA7D8}" type="datetimeFigureOut">
               <a:rPr lang="en-US" smtClean="0"/>
-              <a:t>10/4/2016</a:t>
+              <a:t>9/19/2017</a:t>
             </a:fld>
             <a:endParaRPr lang="en-US"/>
           </a:p>
@@ -2202,10 +2195,9 @@
           </a:lstStyle>
           <a:p>
             <a:r>
-              <a:rPr lang="en-US" smtClean="0"/>
+              <a:rPr lang="en-US"/>
               <a:t>Click to edit Master title style</a:t>
             </a:r>
-            <a:endParaRPr lang="en-US"/>
           </a:p>
         </p:txBody>
       </p:sp>
@@ -2329,7 +2321,7 @@
           <a:p>
             <a:pPr lvl="0"/>
             <a:r>
-              <a:rPr lang="en-US" smtClean="0"/>
+              <a:rPr lang="en-US"/>
               <a:t>Click to edit Master text styles</a:t>
             </a:r>
           </a:p>
@@ -2352,7 +2344,7 @@
           <a:p>
             <a:fld id="{FC2436FE-5B44-4FB0-AF7D-0B9EB63CA7D8}" type="datetimeFigureOut">
               <a:rPr lang="en-US" smtClean="0"/>
-              <a:t>10/4/2016</a:t>
+              <a:t>9/19/2017</a:t>
             </a:fld>
             <a:endParaRPr lang="en-US"/>
           </a:p>
@@ -2461,10 +2453,9 @@
           <a:lstStyle/>
           <a:p>
             <a:r>
-              <a:rPr lang="en-US" smtClean="0"/>
+              <a:rPr lang="en-US"/>
               <a:t>Click to edit Master title style</a:t>
             </a:r>
-            <a:endParaRPr lang="en-US"/>
           </a:p>
         </p:txBody>
       </p:sp>
@@ -2495,38 +2486,37 @@
           <a:p>
             <a:pPr lvl="0"/>
             <a:r>
-              <a:rPr lang="en-US" smtClean="0"/>
+              <a:rPr lang="en-US"/>
               <a:t>Click to edit Master text styles</a:t>
             </a:r>
           </a:p>
           <a:p>
             <a:pPr lvl="1"/>
             <a:r>
-              <a:rPr lang="en-US" smtClean="0"/>
+              <a:rPr lang="en-US"/>
               <a:t>Second level</a:t>
             </a:r>
           </a:p>
           <a:p>
             <a:pPr lvl="2"/>
             <a:r>
-              <a:rPr lang="en-US" smtClean="0"/>
+              <a:rPr lang="en-US"/>
               <a:t>Third level</a:t>
             </a:r>
           </a:p>
           <a:p>
             <a:pPr lvl="3"/>
             <a:r>
-              <a:rPr lang="en-US" smtClean="0"/>
+              <a:rPr lang="en-US"/>
               <a:t>Fourth level</a:t>
             </a:r>
           </a:p>
           <a:p>
             <a:pPr lvl="4"/>
             <a:r>
-              <a:rPr lang="en-US" smtClean="0"/>
+              <a:rPr lang="en-US"/>
               <a:t>Fifth level</a:t>
             </a:r>
-            <a:endParaRPr lang="en-US"/>
           </a:p>
         </p:txBody>
       </p:sp>
@@ -2565,7 +2555,7 @@
           <a:p>
             <a:fld id="{FC2436FE-5B44-4FB0-AF7D-0B9EB63CA7D8}" type="datetimeFigureOut">
               <a:rPr lang="en-US" smtClean="0"/>
-              <a:t>10/4/2016</a:t>
+              <a:t>9/19/2017</a:t>
             </a:fld>
             <a:endParaRPr lang="en-US"/>
           </a:p>
@@ -2986,10 +2976,9 @@
           <a:lstStyle/>
           <a:p>
             <a:r>
-              <a:rPr lang="en-US" dirty="0" smtClean="0"/>
+              <a:rPr lang="en-US" dirty="0"/>
               <a:t>Debugging and profiling tools</a:t>
             </a:r>
-            <a:endParaRPr lang="en-US" dirty="0"/>
           </a:p>
         </p:txBody>
       </p:sp>
@@ -3009,15 +2998,15 @@
           <a:lstStyle/>
           <a:p>
             <a:r>
-              <a:rPr lang="en-US" dirty="0" smtClean="0"/>
+              <a:rPr lang="en-US" dirty="0"/>
               <a:t>Bojan </a:t>
             </a:r>
             <a:r>
-              <a:rPr lang="en-US" dirty="0" err="1" smtClean="0"/>
+              <a:rPr lang="en-US" dirty="0" err="1"/>
               <a:t>Endrovski</a:t>
             </a:r>
             <a:r>
-              <a:rPr lang="en-US" dirty="0" smtClean="0"/>
+              <a:rPr lang="en-US" dirty="0"/>
               <a:t> – endrovski.b@ade-nhtv.nl</a:t>
             </a:r>
           </a:p>
@@ -3072,65 +3061,85 @@
           <a:lstStyle/>
           <a:p>
             <a:r>
-              <a:rPr lang="en-US" dirty="0" smtClean="0"/>
+              <a:rPr lang="en-US" dirty="0"/>
               <a:t>Debugging your game</a:t>
             </a:r>
+          </a:p>
+        </p:txBody>
+      </p:sp>
+      <p:sp>
+        <p:nvSpPr>
+          <p:cNvPr id="3" name="Content Placeholder 2"/>
+          <p:cNvSpPr>
+            <a:spLocks noGrp="1"/>
+          </p:cNvSpPr>
+          <p:nvPr>
+            <p:ph idx="1"/>
+          </p:nvPr>
+        </p:nvSpPr>
+        <p:spPr/>
+        <p:txBody>
+          <a:bodyPr/>
+          <a:lstStyle/>
+          <a:p>
+            <a:r>
+              <a:rPr lang="en-US" dirty="0"/>
+              <a:t>Use VS to the fullest</a:t>
+            </a:r>
+          </a:p>
+          <a:p>
+            <a:pPr lvl="1"/>
+            <a:r>
+              <a:rPr lang="en-US" dirty="0"/>
+              <a:t>Debugging GPU frames</a:t>
+            </a:r>
+          </a:p>
+          <a:p>
+            <a:pPr lvl="1"/>
+            <a:r>
+              <a:rPr lang="en-US" dirty="0"/>
+              <a:t>Many different way to add a breakpoint</a:t>
+            </a:r>
+          </a:p>
+          <a:p>
+            <a:pPr lvl="1"/>
+            <a:r>
+              <a:rPr lang="en-US" dirty="0"/>
+              <a:t>Custom visualizers (color, texture, mesh) </a:t>
+            </a:r>
+          </a:p>
+          <a:p>
+            <a:r>
+              <a:rPr lang="en-US" dirty="0"/>
+              <a:t>Beyond just using a the VS debugger</a:t>
+            </a:r>
+          </a:p>
+          <a:p>
+            <a:pPr lvl="1"/>
+            <a:r>
+              <a:rPr lang="en-US" dirty="0"/>
+              <a:t>Breakpoints are awesome, but…</a:t>
+            </a:r>
+          </a:p>
+          <a:p>
+            <a:pPr lvl="1"/>
+            <a:r>
+              <a:rPr lang="en-US" dirty="0"/>
+              <a:t>Matrices/quaternions make little sense by looking at them</a:t>
+            </a:r>
+          </a:p>
+          <a:p>
+            <a:pPr lvl="1"/>
+            <a:r>
+              <a:rPr lang="en-US" dirty="0"/>
+              <a:t>Black screen with right numbers</a:t>
+            </a:r>
+          </a:p>
+          <a:p>
             <a:endParaRPr lang="en-US" dirty="0"/>
           </a:p>
-        </p:txBody>
-      </p:sp>
-      <p:sp>
-        <p:nvSpPr>
-          <p:cNvPr id="3" name="Content Placeholder 2"/>
-          <p:cNvSpPr>
-            <a:spLocks noGrp="1"/>
-          </p:cNvSpPr>
-          <p:nvPr>
-            <p:ph idx="1"/>
-          </p:nvPr>
-        </p:nvSpPr>
-        <p:spPr/>
-        <p:txBody>
-          <a:bodyPr/>
-          <a:lstStyle/>
-          <a:p>
-            <a:r>
-              <a:rPr lang="en-US" dirty="0" smtClean="0"/>
-              <a:t>Beyond just using a the VS debugger</a:t>
-            </a:r>
-          </a:p>
-          <a:p>
-            <a:pPr lvl="1"/>
-            <a:r>
-              <a:rPr lang="en-US" dirty="0" smtClean="0"/>
-              <a:t>Breakpoints are awesome, but…</a:t>
-            </a:r>
-          </a:p>
-          <a:p>
-            <a:pPr lvl="1"/>
-            <a:r>
-              <a:rPr lang="en-US" dirty="0" smtClean="0"/>
-              <a:t>Matrices/quaternions make little sense by looking at them</a:t>
-            </a:r>
-          </a:p>
-          <a:p>
-            <a:pPr lvl="1"/>
-            <a:r>
-              <a:rPr lang="en-US" dirty="0" smtClean="0"/>
-              <a:t>Black screen with right numbers</a:t>
-            </a:r>
-          </a:p>
-          <a:p>
-            <a:r>
-              <a:rPr lang="en-US" dirty="0" smtClean="0"/>
-              <a:t>You can add </a:t>
-            </a:r>
-          </a:p>
-          <a:p>
-            <a:endParaRPr lang="en-US" dirty="0" smtClean="0"/>
-          </a:p>
-          <a:p>
-            <a:endParaRPr lang="en-US" dirty="0" smtClean="0"/>
+          <a:p>
+            <a:endParaRPr lang="en-US" dirty="0"/>
           </a:p>
         </p:txBody>
       </p:sp>
@@ -3180,71 +3189,70 @@
           <a:lstStyle/>
           <a:p>
             <a:r>
-              <a:rPr lang="en-US" dirty="0" smtClean="0"/>
+              <a:rPr lang="en-US" dirty="0"/>
               <a:t>Debug rendering</a:t>
             </a:r>
+          </a:p>
+        </p:txBody>
+      </p:sp>
+      <p:sp>
+        <p:nvSpPr>
+          <p:cNvPr id="3" name="Content Placeholder 2"/>
+          <p:cNvSpPr>
+            <a:spLocks noGrp="1"/>
+          </p:cNvSpPr>
+          <p:nvPr>
+            <p:ph idx="1"/>
+          </p:nvPr>
+        </p:nvSpPr>
+        <p:spPr/>
+        <p:txBody>
+          <a:bodyPr/>
+          <a:lstStyle/>
+          <a:p>
+            <a:r>
+              <a:rPr lang="en-US" dirty="0"/>
+              <a:t>Your eyes in the dark</a:t>
+            </a:r>
+          </a:p>
+          <a:p>
+            <a:r>
+              <a:rPr lang="en-US" dirty="0"/>
+              <a:t>Keep it simple</a:t>
+            </a:r>
+          </a:p>
+          <a:p>
+            <a:r>
+              <a:rPr lang="en-US" dirty="0"/>
+              <a:t>Keep it separate from the rest of the engine as much as possible</a:t>
+            </a:r>
+          </a:p>
+          <a:p>
+            <a:r>
+              <a:rPr lang="en-US" dirty="0"/>
+              <a:t>Don’t forget middleware tools</a:t>
+            </a:r>
+          </a:p>
+          <a:p>
+            <a:pPr lvl="1"/>
+            <a:r>
+              <a:rPr lang="en-US" dirty="0"/>
+              <a:t>PhysX debugger</a:t>
+            </a:r>
+          </a:p>
+          <a:p>
+            <a:pPr lvl="1"/>
+            <a:r>
+              <a:rPr lang="en-US" dirty="0"/>
+              <a:t>Umbra debugger</a:t>
+            </a:r>
+          </a:p>
+          <a:p>
+            <a:pPr lvl="1"/>
             <a:endParaRPr lang="en-US" dirty="0"/>
           </a:p>
-        </p:txBody>
-      </p:sp>
-      <p:sp>
-        <p:nvSpPr>
-          <p:cNvPr id="3" name="Content Placeholder 2"/>
-          <p:cNvSpPr>
-            <a:spLocks noGrp="1"/>
-          </p:cNvSpPr>
-          <p:nvPr>
-            <p:ph idx="1"/>
-          </p:nvPr>
-        </p:nvSpPr>
-        <p:spPr/>
-        <p:txBody>
-          <a:bodyPr/>
-          <a:lstStyle/>
-          <a:p>
-            <a:r>
-              <a:rPr lang="en-US" dirty="0" smtClean="0"/>
-              <a:t>Your eyes in the dark</a:t>
-            </a:r>
-          </a:p>
-          <a:p>
-            <a:r>
-              <a:rPr lang="en-US" dirty="0" smtClean="0"/>
-              <a:t>Keep it simple</a:t>
-            </a:r>
-          </a:p>
-          <a:p>
-            <a:r>
-              <a:rPr lang="en-US" dirty="0" smtClean="0"/>
-              <a:t>Keep it separate from the rest of the engine as much as possible</a:t>
-            </a:r>
-          </a:p>
-          <a:p>
-            <a:r>
-              <a:rPr lang="en-US" dirty="0" smtClean="0"/>
-              <a:t>Don’t forget middleware tools</a:t>
-            </a:r>
-          </a:p>
-          <a:p>
-            <a:pPr lvl="1"/>
-            <a:r>
-              <a:rPr lang="en-US" dirty="0" smtClean="0"/>
-              <a:t>PhysX debugger</a:t>
-            </a:r>
-          </a:p>
-          <a:p>
-            <a:pPr lvl="1"/>
-            <a:r>
-              <a:rPr lang="en-US" dirty="0" smtClean="0"/>
-              <a:t>Umbra debugger</a:t>
-            </a:r>
-          </a:p>
-          <a:p>
-            <a:pPr lvl="1"/>
-            <a:endParaRPr lang="en-US" dirty="0" smtClean="0"/>
-          </a:p>
-          <a:p>
-            <a:endParaRPr lang="en-US" dirty="0" smtClean="0"/>
+          <a:p>
+            <a:endParaRPr lang="en-US" dirty="0"/>
           </a:p>
           <a:p>
             <a:endParaRPr lang="en-US" dirty="0"/>
@@ -3297,40 +3305,38 @@
           <a:lstStyle/>
           <a:p>
             <a:r>
-              <a:rPr lang="en-US" dirty="0" smtClean="0"/>
+              <a:rPr lang="en-US" dirty="0"/>
               <a:t>Look into code</a:t>
             </a:r>
+          </a:p>
+        </p:txBody>
+      </p:sp>
+      <p:sp>
+        <p:nvSpPr>
+          <p:cNvPr id="3" name="Content Placeholder 2"/>
+          <p:cNvSpPr>
+            <a:spLocks noGrp="1"/>
+          </p:cNvSpPr>
+          <p:nvPr>
+            <p:ph idx="1"/>
+          </p:nvPr>
+        </p:nvSpPr>
+        <p:spPr/>
+        <p:txBody>
+          <a:bodyPr/>
+          <a:lstStyle/>
+          <a:p>
+            <a:r>
+              <a:rPr lang="en-US" dirty="0" err="1"/>
+              <a:t>DebugRenderer</a:t>
+            </a:r>
             <a:endParaRPr lang="en-US" dirty="0"/>
           </a:p>
-        </p:txBody>
-      </p:sp>
-      <p:sp>
-        <p:nvSpPr>
-          <p:cNvPr id="3" name="Content Placeholder 2"/>
-          <p:cNvSpPr>
-            <a:spLocks noGrp="1"/>
-          </p:cNvSpPr>
-          <p:nvPr>
-            <p:ph idx="1"/>
-          </p:nvPr>
-        </p:nvSpPr>
-        <p:spPr/>
-        <p:txBody>
-          <a:bodyPr/>
-          <a:lstStyle/>
-          <a:p>
-            <a:r>
-              <a:rPr lang="en-US" dirty="0" err="1" smtClean="0"/>
-              <a:t>DebugRenderer</a:t>
-            </a:r>
-            <a:endParaRPr lang="en-US" dirty="0" smtClean="0"/>
-          </a:p>
-          <a:p>
-            <a:r>
-              <a:rPr lang="en-US" dirty="0" smtClean="0"/>
+          <a:p>
+            <a:r>
+              <a:rPr lang="en-US" dirty="0"/>
               <a:t>Lines and points</a:t>
             </a:r>
-            <a:endParaRPr lang="en-US" dirty="0"/>
           </a:p>
         </p:txBody>
       </p:sp>
@@ -3380,10 +3386,9 @@
           <a:lstStyle/>
           <a:p>
             <a:r>
-              <a:rPr lang="en-US" dirty="0" smtClean="0"/>
+              <a:rPr lang="en-US" dirty="0"/>
               <a:t>Profiling – using profiling tools</a:t>
             </a:r>
-            <a:endParaRPr lang="en-US" dirty="0"/>
           </a:p>
         </p:txBody>
       </p:sp>
@@ -3405,131 +3410,119 @@
           <a:lstStyle/>
           <a:p>
             <a:r>
-              <a:rPr lang="en-US" dirty="0" smtClean="0"/>
+              <a:rPr lang="en-US" dirty="0"/>
               <a:t>VS included tools (GPU, CPU, Memory)</a:t>
             </a:r>
           </a:p>
           <a:p>
             <a:pPr lvl="1"/>
             <a:r>
-              <a:rPr lang="en-US" dirty="0" smtClean="0"/>
+              <a:rPr lang="en-US" dirty="0"/>
               <a:t>Roughly same tools for Xbox One</a:t>
             </a:r>
           </a:p>
           <a:p>
             <a:r>
-              <a:rPr lang="en-US" dirty="0" err="1" smtClean="0"/>
+              <a:rPr lang="en-US" dirty="0" err="1"/>
               <a:t>Xcode</a:t>
             </a:r>
             <a:r>
-              <a:rPr lang="en-US" dirty="0" smtClean="0"/>
+              <a:rPr lang="en-US" dirty="0"/>
               <a:t> toolset for iOS and </a:t>
             </a:r>
             <a:r>
-              <a:rPr lang="en-US" dirty="0" err="1" smtClean="0"/>
+              <a:rPr lang="en-US" dirty="0" err="1"/>
               <a:t>macOS</a:t>
             </a:r>
             <a:r>
-              <a:rPr lang="en-US" dirty="0" smtClean="0"/>
+              <a:rPr lang="en-US" dirty="0"/>
+              <a:t> (GPU, CPU, Memory, Leaks, Battery)</a:t>
+            </a:r>
+          </a:p>
+          <a:p>
+            <a:r>
+              <a:rPr lang="en-US" dirty="0"/>
+              <a:t>CPU</a:t>
+            </a:r>
+          </a:p>
+          <a:p>
+            <a:pPr lvl="1"/>
+            <a:r>
+              <a:rPr lang="en-US" dirty="0"/>
+              <a:t>Intel </a:t>
+            </a:r>
+            <a:r>
+              <a:rPr lang="en-US" dirty="0" err="1"/>
+              <a:t>Vtune</a:t>
+            </a:r>
+            <a:r>
+              <a:rPr lang="en-US" dirty="0"/>
+              <a:t> (not cheap)</a:t>
+            </a:r>
+          </a:p>
+          <a:p>
+            <a:pPr lvl="1"/>
+            <a:r>
+              <a:rPr lang="en-US" dirty="0"/>
+              <a:t>Very Sleepy</a:t>
+            </a:r>
+          </a:p>
+          <a:p>
+            <a:r>
+              <a:rPr lang="en-US" dirty="0"/>
+              <a:t>Graphics/GPU Tools</a:t>
+            </a:r>
+          </a:p>
+          <a:p>
+            <a:pPr lvl="1"/>
+            <a:r>
+              <a:rPr lang="en-US" b="1" dirty="0" err="1"/>
+              <a:t>RenderDoc</a:t>
+            </a:r>
+            <a:endParaRPr lang="en-US" b="1" dirty="0"/>
+          </a:p>
+          <a:p>
+            <a:pPr lvl="1"/>
+            <a:r>
+              <a:rPr lang="en-US" dirty="0"/>
+              <a:t>AMD </a:t>
+            </a:r>
+            <a:r>
+              <a:rPr lang="en-US" dirty="0" err="1"/>
+              <a:t>CodeXL</a:t>
+            </a:r>
+            <a:r>
+              <a:rPr lang="en-US" dirty="0"/>
+              <a:t> (CPU too)</a:t>
+            </a:r>
+          </a:p>
+          <a:p>
+            <a:pPr lvl="1"/>
+            <a:r>
+              <a:rPr lang="en-US" dirty="0" err="1"/>
+              <a:t>Nvidia</a:t>
+            </a:r>
+            <a:r>
+              <a:rPr lang="en-US" dirty="0"/>
               <a:t> </a:t>
             </a:r>
             <a:r>
-              <a:rPr lang="en-US" dirty="0" smtClean="0"/>
-              <a:t>(GPU, CPU, Memory, Leaks, Battery)</a:t>
-            </a:r>
-          </a:p>
-          <a:p>
-            <a:r>
-              <a:rPr lang="en-US" dirty="0" smtClean="0"/>
-              <a:t>CPU</a:t>
-            </a:r>
-          </a:p>
-          <a:p>
-            <a:pPr lvl="1"/>
-            <a:r>
-              <a:rPr lang="en-US" dirty="0" smtClean="0"/>
-              <a:t>Intel </a:t>
-            </a:r>
-            <a:r>
-              <a:rPr lang="en-US" dirty="0" err="1" smtClean="0"/>
-              <a:t>Vtune</a:t>
-            </a:r>
-            <a:r>
-              <a:rPr lang="en-US" dirty="0" smtClean="0"/>
-              <a:t> (not cheap)</a:t>
-            </a:r>
-          </a:p>
-          <a:p>
-            <a:pPr lvl="1"/>
-            <a:r>
-              <a:rPr lang="en-US" dirty="0" smtClean="0"/>
-              <a:t>Very Sleepy</a:t>
-            </a:r>
-          </a:p>
-          <a:p>
-            <a:r>
-              <a:rPr lang="en-US" dirty="0" smtClean="0"/>
-              <a:t>G</a:t>
-            </a:r>
-            <a:r>
-              <a:rPr lang="en-US" dirty="0" smtClean="0"/>
-              <a:t>raphics/</a:t>
-            </a:r>
-            <a:r>
-              <a:rPr lang="en-US" dirty="0" smtClean="0"/>
-              <a:t>GPU Tools</a:t>
-            </a:r>
-          </a:p>
-          <a:p>
-            <a:pPr lvl="1"/>
-            <a:r>
-              <a:rPr lang="en-US" dirty="0" err="1" smtClean="0"/>
-              <a:t>RenderDoc</a:t>
-            </a:r>
-            <a:endParaRPr lang="en-US" dirty="0" smtClean="0"/>
-          </a:p>
-          <a:p>
-            <a:pPr lvl="1"/>
-            <a:r>
-              <a:rPr lang="en-US" dirty="0" smtClean="0"/>
-              <a:t>AMD </a:t>
-            </a:r>
-            <a:r>
-              <a:rPr lang="en-US" dirty="0" err="1" smtClean="0"/>
-              <a:t>CodeXL</a:t>
-            </a:r>
-            <a:r>
-              <a:rPr lang="en-US" dirty="0" smtClean="0"/>
-              <a:t> (CPU too)</a:t>
-            </a:r>
-          </a:p>
-          <a:p>
-            <a:pPr lvl="1"/>
-            <a:r>
-              <a:rPr lang="en-US" dirty="0" err="1" smtClean="0"/>
-              <a:t>Nvidia</a:t>
-            </a:r>
-            <a:r>
-              <a:rPr lang="en-US" dirty="0" smtClean="0"/>
-              <a:t> </a:t>
-            </a:r>
-            <a:r>
-              <a:rPr lang="en-US" dirty="0" err="1" smtClean="0"/>
+              <a:rPr lang="en-US" dirty="0" err="1"/>
               <a:t>Nsight</a:t>
             </a:r>
             <a:r>
-              <a:rPr lang="en-US" dirty="0" smtClean="0"/>
+              <a:rPr lang="en-US" dirty="0"/>
               <a:t> (haven’t gotten it to work reliably)</a:t>
             </a:r>
           </a:p>
           <a:p>
             <a:r>
-              <a:rPr lang="en-US" dirty="0" smtClean="0"/>
+              <a:rPr lang="en-US" dirty="0"/>
               <a:t>Using VLD for leak detection (broken on Win 10 Anniversary)</a:t>
             </a:r>
           </a:p>
           <a:p>
-            <a:endParaRPr lang="en-US" dirty="0" smtClean="0"/>
+            <a:endParaRPr lang="en-US" dirty="0"/>
           </a:p>
           <a:p>
             <a:pPr lvl="2"/>
@@ -3583,10 +3576,9 @@
           <a:lstStyle/>
           <a:p>
             <a:r>
-              <a:rPr lang="en-US" dirty="0" smtClean="0"/>
+              <a:rPr lang="en-US" dirty="0"/>
               <a:t>Profiling – roll out your own</a:t>
             </a:r>
-            <a:endParaRPr lang="en-US" dirty="0"/>
           </a:p>
         </p:txBody>
       </p:sp>
@@ -3606,50 +3598,63 @@
           <a:lstStyle/>
           <a:p>
             <a:r>
-              <a:rPr lang="en-US" dirty="0" smtClean="0"/>
+              <a:rPr lang="en-US" dirty="0"/>
               <a:t>Task specific profilers</a:t>
             </a:r>
           </a:p>
           <a:p>
             <a:pPr lvl="1"/>
             <a:r>
-              <a:rPr lang="en-US" dirty="0" smtClean="0"/>
+              <a:rPr lang="en-US" dirty="0"/>
+              <a:t>Graphics profiling</a:t>
+            </a:r>
+          </a:p>
+          <a:p>
+            <a:pPr lvl="1"/>
+            <a:r>
+              <a:rPr lang="en-US" dirty="0"/>
               <a:t>Own memory</a:t>
             </a:r>
           </a:p>
           <a:p>
             <a:pPr lvl="1"/>
             <a:r>
-              <a:rPr lang="en-US" dirty="0" smtClean="0"/>
+              <a:rPr lang="en-US" dirty="0"/>
               <a:t>Code segments</a:t>
             </a:r>
           </a:p>
           <a:p>
             <a:pPr lvl="1"/>
             <a:r>
-              <a:rPr lang="en-US" dirty="0" smtClean="0"/>
+              <a:rPr lang="en-US" dirty="0"/>
               <a:t>Exotic platforms</a:t>
             </a:r>
           </a:p>
           <a:p>
             <a:r>
-              <a:rPr lang="en-US" dirty="0" smtClean="0"/>
+              <a:rPr lang="en-US" dirty="0"/>
               <a:t>Task specific tools</a:t>
             </a:r>
-            <a:endParaRPr lang="en-US" dirty="0" smtClean="0"/>
           </a:p>
           <a:p>
             <a:pPr lvl="1"/>
             <a:r>
-              <a:rPr lang="en-US" dirty="0" smtClean="0"/>
+              <a:rPr lang="en-US" dirty="0"/>
               <a:t>Occlusion</a:t>
             </a:r>
           </a:p>
           <a:p>
             <a:pPr lvl="1"/>
             <a:r>
-              <a:rPr lang="en-US" dirty="0" smtClean="0"/>
+              <a:rPr lang="en-US" dirty="0"/>
               <a:t>Space partitioning</a:t>
+            </a:r>
+          </a:p>
+          <a:p>
+            <a:pPr lvl="1"/>
+            <a:r>
+              <a:rPr lang="en-US" dirty="0"/>
+              <a:t>AI</a:t>
             </a:r>
           </a:p>
         </p:txBody>
@@ -3700,10 +3705,9 @@
           <a:lstStyle/>
           <a:p>
             <a:r>
-              <a:rPr lang="en-US" dirty="0" smtClean="0"/>
+              <a:rPr lang="en-US" dirty="0"/>
               <a:t>Look into code</a:t>
             </a:r>
-            <a:endParaRPr lang="en-US" dirty="0"/>
           </a:p>
         </p:txBody>
       </p:sp>
@@ -3723,30 +3727,25 @@
           <a:lstStyle/>
           <a:p>
             <a:r>
-              <a:rPr lang="en-US" dirty="0" err="1" smtClean="0"/>
+              <a:rPr lang="en-US" dirty="0" err="1"/>
               <a:t>ImGui</a:t>
             </a:r>
             <a:r>
-              <a:rPr lang="en-US" dirty="0" smtClean="0"/>
+              <a:rPr lang="en-US" dirty="0"/>
               <a:t> for in-game code</a:t>
             </a:r>
           </a:p>
           <a:p>
             <a:r>
-              <a:rPr lang="en-US" dirty="0" smtClean="0"/>
-              <a:t>Profiler</a:t>
-            </a:r>
-            <a:r>
-              <a:rPr lang="en-US" dirty="0" smtClean="0"/>
-              <a:t> </a:t>
-            </a:r>
-          </a:p>
-          <a:p>
-            <a:r>
-              <a:rPr lang="en-US" dirty="0" smtClean="0"/>
+              <a:rPr lang="en-US" dirty="0"/>
+              <a:t>Profiler </a:t>
+            </a:r>
+          </a:p>
+          <a:p>
+            <a:r>
+              <a:rPr lang="en-US" dirty="0"/>
               <a:t>Inspector</a:t>
             </a:r>
-            <a:endParaRPr lang="en-US" dirty="0" smtClean="0"/>
           </a:p>
           <a:p>
             <a:endParaRPr lang="en-US" dirty="0"/>
@@ -3757,6 +3756,180 @@
     <p:extLst>
       <p:ext uri="{BB962C8B-B14F-4D97-AF65-F5344CB8AC3E}">
         <p14:creationId xmlns:p14="http://schemas.microsoft.com/office/powerpoint/2010/main" val="788965012"/>
+      </p:ext>
+    </p:extLst>
+  </p:cSld>
+  <p:clrMapOvr>
+    <a:masterClrMapping/>
+  </p:clrMapOvr>
+</p:sld>
+</file>
+
+<file path=ppt/slides/slide8.xml><?xml version="1.0" encoding="utf-8"?>
+<p:sld xmlns:a="http://schemas.openxmlformats.org/drawingml/2006/main" xmlns:r="http://schemas.openxmlformats.org/officeDocument/2006/relationships" xmlns:p="http://schemas.openxmlformats.org/presentationml/2006/main">
+  <p:cSld>
+    <p:spTree>
+      <p:nvGrpSpPr>
+        <p:cNvPr id="1" name=""/>
+        <p:cNvGrpSpPr/>
+        <p:nvPr/>
+      </p:nvGrpSpPr>
+      <p:grpSpPr>
+        <a:xfrm>
+          <a:off x="0" y="0"/>
+          <a:ext cx="0" cy="0"/>
+          <a:chOff x="0" y="0"/>
+          <a:chExt cx="0" cy="0"/>
+        </a:xfrm>
+      </p:grpSpPr>
+      <p:sp>
+        <p:nvSpPr>
+          <p:cNvPr id="2" name="Title 1">
+            <a:extLst>
+              <a:ext uri="{FF2B5EF4-FFF2-40B4-BE49-F238E27FC236}">
+                <a16:creationId xmlns:a16="http://schemas.microsoft.com/office/drawing/2014/main" id="{59B65620-CC5F-406C-A697-B497C2BBF448}"/>
+              </a:ext>
+            </a:extLst>
+          </p:cNvPr>
+          <p:cNvSpPr>
+            <a:spLocks noGrp="1"/>
+          </p:cNvSpPr>
+          <p:nvPr>
+            <p:ph type="title"/>
+          </p:nvPr>
+        </p:nvSpPr>
+        <p:spPr/>
+        <p:txBody>
+          <a:bodyPr/>
+          <a:lstStyle/>
+          <a:p>
+            <a:r>
+              <a:rPr lang="en-US" dirty="0"/>
+              <a:t>Questions</a:t>
+            </a:r>
+          </a:p>
+        </p:txBody>
+      </p:sp>
+      <p:sp>
+        <p:nvSpPr>
+          <p:cNvPr id="3" name="Content Placeholder 2">
+            <a:extLst>
+              <a:ext uri="{FF2B5EF4-FFF2-40B4-BE49-F238E27FC236}">
+                <a16:creationId xmlns:a16="http://schemas.microsoft.com/office/drawing/2014/main" id="{D1BAFE72-A3CA-46DA-BB46-56C850BE5959}"/>
+              </a:ext>
+            </a:extLst>
+          </p:cNvPr>
+          <p:cNvSpPr>
+            <a:spLocks noGrp="1"/>
+          </p:cNvSpPr>
+          <p:nvPr>
+            <p:ph idx="1"/>
+          </p:nvPr>
+        </p:nvSpPr>
+        <p:spPr/>
+        <p:txBody>
+          <a:bodyPr>
+            <a:normAutofit/>
+          </a:bodyPr>
+          <a:lstStyle/>
+          <a:p>
+            <a:pPr marL="0" indent="0" algn="ctr">
+              <a:buNone/>
+            </a:pPr>
+            <a:r>
+              <a:rPr lang="en-US" sz="23900" dirty="0"/>
+              <a:t>?</a:t>
+            </a:r>
+          </a:p>
+        </p:txBody>
+      </p:sp>
+    </p:spTree>
+    <p:extLst>
+      <p:ext uri="{BB962C8B-B14F-4D97-AF65-F5344CB8AC3E}">
+        <p14:creationId xmlns:p14="http://schemas.microsoft.com/office/powerpoint/2010/main" val="3742516626"/>
+      </p:ext>
+    </p:extLst>
+  </p:cSld>
+  <p:clrMapOvr>
+    <a:masterClrMapping/>
+  </p:clrMapOvr>
+</p:sld>
+</file>
+
+<file path=ppt/slides/slide9.xml><?xml version="1.0" encoding="utf-8"?>
+<p:sld xmlns:a="http://schemas.openxmlformats.org/drawingml/2006/main" xmlns:r="http://schemas.openxmlformats.org/officeDocument/2006/relationships" xmlns:p="http://schemas.openxmlformats.org/presentationml/2006/main">
+  <p:cSld>
+    <p:spTree>
+      <p:nvGrpSpPr>
+        <p:cNvPr id="1" name=""/>
+        <p:cNvGrpSpPr/>
+        <p:nvPr/>
+      </p:nvGrpSpPr>
+      <p:grpSpPr>
+        <a:xfrm>
+          <a:off x="0" y="0"/>
+          <a:ext cx="0" cy="0"/>
+          <a:chOff x="0" y="0"/>
+          <a:chExt cx="0" cy="0"/>
+        </a:xfrm>
+      </p:grpSpPr>
+      <p:sp>
+        <p:nvSpPr>
+          <p:cNvPr id="2" name="Title 1">
+            <a:extLst>
+              <a:ext uri="{FF2B5EF4-FFF2-40B4-BE49-F238E27FC236}">
+                <a16:creationId xmlns:a16="http://schemas.microsoft.com/office/drawing/2014/main" id="{59B65620-CC5F-406C-A697-B497C2BBF448}"/>
+              </a:ext>
+            </a:extLst>
+          </p:cNvPr>
+          <p:cNvSpPr>
+            <a:spLocks noGrp="1"/>
+          </p:cNvSpPr>
+          <p:nvPr>
+            <p:ph type="title"/>
+          </p:nvPr>
+        </p:nvSpPr>
+        <p:spPr/>
+        <p:txBody>
+          <a:bodyPr/>
+          <a:lstStyle/>
+          <a:p>
+            <a:r>
+              <a:rPr lang="en-US" dirty="0"/>
+              <a:t>Thank you</a:t>
+            </a:r>
+          </a:p>
+        </p:txBody>
+      </p:sp>
+      <p:sp>
+        <p:nvSpPr>
+          <p:cNvPr id="3" name="Content Placeholder 2">
+            <a:extLst>
+              <a:ext uri="{FF2B5EF4-FFF2-40B4-BE49-F238E27FC236}">
+                <a16:creationId xmlns:a16="http://schemas.microsoft.com/office/drawing/2014/main" id="{D1BAFE72-A3CA-46DA-BB46-56C850BE5959}"/>
+              </a:ext>
+            </a:extLst>
+          </p:cNvPr>
+          <p:cNvSpPr>
+            <a:spLocks noGrp="1"/>
+          </p:cNvSpPr>
+          <p:nvPr>
+            <p:ph idx="1"/>
+          </p:nvPr>
+        </p:nvSpPr>
+        <p:spPr/>
+        <p:txBody>
+          <a:bodyPr/>
+          <a:lstStyle/>
+          <a:p>
+            <a:endParaRPr lang="en-US"/>
+          </a:p>
+        </p:txBody>
+      </p:sp>
+    </p:spTree>
+    <p:extLst>
+      <p:ext uri="{BB962C8B-B14F-4D97-AF65-F5344CB8AC3E}">
+        <p14:creationId xmlns:p14="http://schemas.microsoft.com/office/powerpoint/2010/main" val="1430020491"/>
       </p:ext>
     </p:extLst>
   </p:cSld>

</xml_diff>